<commit_message>
homework assigment 02 uploaded
</commit_message>
<xml_diff>
--- a/slides/02_ML_Linear_modelsA.pptx
+++ b/slides/02_ML_Linear_modelsA.pptx
@@ -229,7 +229,7 @@
           <a:p>
             <a:fld id="{83A43D8E-262F-43F1-B0CF-97ED6AAA9912}" type="datetimeFigureOut">
               <a:rPr lang="en-US" smtClean="0"/>
-              <a:t>2/11/2020</a:t>
+              <a:t>2/13/2020</a:t>
             </a:fld>
             <a:endParaRPr lang="en-US"/>
           </a:p>
@@ -406,7 +406,7 @@
           <a:p>
             <a:fld id="{03B42920-386F-4187-8314-27C56E157030}" type="datetimeFigureOut">
               <a:rPr lang="en-US" smtClean="0"/>
-              <a:t>2/11/2020</a:t>
+              <a:t>2/13/2020</a:t>
             </a:fld>
             <a:endParaRPr lang="en-US"/>
           </a:p>
@@ -1116,6 +1116,230 @@
                   <a:t>Why matrix form is important? Because it makes notations easier, it helps to abstract up theory, it’s the preferred way to compute since there is compiler speed up for vectorized form, in contrast to (for) loops.</a:t>
                 </a:r>
               </a:p>
+              <a:p>
+                <a:endParaRPr lang="en-US" dirty="0"/>
+              </a:p>
+              <a:p>
+                <a:r>
+                  <a:rPr lang="en-US" dirty="0"/>
+                  <a:t>What could be a matrix form to compute </a:t>
+                </a:r>
+                <a14:m>
+                  <m:oMath xmlns:m="http://schemas.openxmlformats.org/officeDocument/2006/math">
+                    <m:r>
+                      <a:rPr lang="en-US" b="0" i="1" smtClean="0">
+                        <a:latin typeface="Cambria Math" panose="02040503050406030204" pitchFamily="18" charset="0"/>
+                      </a:rPr>
+                      <m:t>𝜃</m:t>
+                    </m:r>
+                  </m:oMath>
+                </a14:m>
+                <a:r>
+                  <a:rPr lang="en-US" dirty="0"/>
+                  <a:t>?</a:t>
+                </a:r>
+                <a:r>
+                  <a:rPr lang="en-US" baseline="0" dirty="0"/>
+                  <a:t> There are 2 ways (</a:t>
+                </a:r>
+                <a14:m>
+                  <m:oMath xmlns:m="http://schemas.openxmlformats.org/officeDocument/2006/math">
+                    <m:r>
+                      <a:rPr lang="en-US" b="1" i="1" baseline="0" smtClean="0">
+                        <a:latin typeface="Cambria Math" panose="02040503050406030204" pitchFamily="18" charset="0"/>
+                      </a:rPr>
+                      <m:t>𝒙</m:t>
+                    </m:r>
+                  </m:oMath>
+                </a14:m>
+                <a:r>
+                  <a:rPr lang="en-US" baseline="0" dirty="0"/>
+                  <a:t>, </a:t>
+                </a:r>
+                <a14:m>
+                  <m:oMath xmlns:m="http://schemas.openxmlformats.org/officeDocument/2006/math">
+                    <m:r>
+                      <a:rPr lang="en-US" b="1" i="1" baseline="0" smtClean="0">
+                        <a:latin typeface="Cambria Math" panose="02040503050406030204" pitchFamily="18" charset="0"/>
+                      </a:rPr>
+                      <m:t>𝒚</m:t>
+                    </m:r>
+                  </m:oMath>
+                </a14:m>
+                <a:r>
+                  <a:rPr lang="en-US" baseline="0" dirty="0"/>
+                  <a:t> or </a:t>
+                </a:r>
+                <a14:m>
+                  <m:oMath xmlns:m="http://schemas.openxmlformats.org/officeDocument/2006/math">
+                    <m:sSub>
+                      <m:sSubPr>
+                        <m:ctrlPr>
+                          <a:rPr lang="en-US" b="0" i="1" baseline="0" smtClean="0">
+                            <a:latin typeface="Cambria Math" panose="02040503050406030204" pitchFamily="18" charset="0"/>
+                          </a:rPr>
+                        </m:ctrlPr>
+                      </m:sSubPr>
+                      <m:e>
+                        <m:r>
+                          <a:rPr lang="en-US" b="1" i="1" baseline="0" smtClean="0">
+                            <a:latin typeface="Cambria Math" panose="02040503050406030204" pitchFamily="18" charset="0"/>
+                          </a:rPr>
+                          <m:t>𝒙</m:t>
+                        </m:r>
+                      </m:e>
+                      <m:sub>
+                        <m:r>
+                          <a:rPr lang="en-US" b="0" i="1" baseline="0" smtClean="0">
+                            <a:latin typeface="Cambria Math" panose="02040503050406030204" pitchFamily="18" charset="0"/>
+                          </a:rPr>
+                          <m:t>1</m:t>
+                        </m:r>
+                      </m:sub>
+                    </m:sSub>
+                  </m:oMath>
+                </a14:m>
+                <a:r>
+                  <a:rPr lang="en-US" baseline="0" dirty="0"/>
+                  <a:t>, </a:t>
+                </a:r>
+                <a14:m>
+                  <m:oMath xmlns:m="http://schemas.openxmlformats.org/officeDocument/2006/math">
+                    <m:sSub>
+                      <m:sSubPr>
+                        <m:ctrlPr>
+                          <a:rPr lang="en-US" b="0" i="1" baseline="0" smtClean="0">
+                            <a:latin typeface="Cambria Math" panose="02040503050406030204" pitchFamily="18" charset="0"/>
+                          </a:rPr>
+                        </m:ctrlPr>
+                      </m:sSubPr>
+                      <m:e>
+                        <m:r>
+                          <a:rPr lang="en-US" b="1" i="1" baseline="0" smtClean="0">
+                            <a:latin typeface="Cambria Math" panose="02040503050406030204" pitchFamily="18" charset="0"/>
+                          </a:rPr>
+                          <m:t>𝒙</m:t>
+                        </m:r>
+                      </m:e>
+                      <m:sub>
+                        <m:r>
+                          <a:rPr lang="en-US" b="0" i="1" baseline="0" smtClean="0">
+                            <a:latin typeface="Cambria Math" panose="02040503050406030204" pitchFamily="18" charset="0"/>
+                          </a:rPr>
+                          <m:t>2</m:t>
+                        </m:r>
+                      </m:sub>
+                    </m:sSub>
+                  </m:oMath>
+                </a14:m>
+                <a:r>
+                  <a:rPr lang="en-US" baseline="0" dirty="0"/>
+                  <a:t>), </a:t>
+                </a:r>
+                <a:r>
+                  <a:rPr lang="en-US" baseline="0" dirty="0" err="1"/>
+                  <a:t>i</a:t>
+                </a:r>
+                <a:r>
+                  <a:rPr lang="en-US" baseline="0" dirty="0"/>
+                  <a:t>. e., if the data set is in a table/tabular form, then we could slice by rows (</a:t>
+                </a:r>
+                <a14:m>
+                  <m:oMath xmlns:m="http://schemas.openxmlformats.org/officeDocument/2006/math">
+                    <m:sSub>
+                      <m:sSubPr>
+                        <m:ctrlPr>
+                          <a:rPr lang="en-US" b="0" i="1" baseline="0" smtClean="0">
+                            <a:latin typeface="Cambria Math" panose="02040503050406030204" pitchFamily="18" charset="0"/>
+                          </a:rPr>
+                        </m:ctrlPr>
+                      </m:sSubPr>
+                      <m:e>
+                        <m:r>
+                          <a:rPr lang="en-US" b="1" i="1" baseline="0" smtClean="0">
+                            <a:latin typeface="Cambria Math" panose="02040503050406030204" pitchFamily="18" charset="0"/>
+                          </a:rPr>
+                          <m:t>𝒙</m:t>
+                        </m:r>
+                      </m:e>
+                      <m:sub>
+                        <m:r>
+                          <a:rPr lang="en-US" b="0" i="1" baseline="0" smtClean="0">
+                            <a:latin typeface="Cambria Math" panose="02040503050406030204" pitchFamily="18" charset="0"/>
+                          </a:rPr>
+                          <m:t>1</m:t>
+                        </m:r>
+                      </m:sub>
+                    </m:sSub>
+                  </m:oMath>
+                </a14:m>
+                <a:r>
+                  <a:rPr lang="en-US" baseline="0" dirty="0"/>
+                  <a:t>, </a:t>
+                </a:r>
+                <a14:m>
+                  <m:oMath xmlns:m="http://schemas.openxmlformats.org/officeDocument/2006/math">
+                    <m:sSub>
+                      <m:sSubPr>
+                        <m:ctrlPr>
+                          <a:rPr lang="en-US" b="0" i="1" baseline="0" smtClean="0">
+                            <a:latin typeface="Cambria Math" panose="02040503050406030204" pitchFamily="18" charset="0"/>
+                          </a:rPr>
+                        </m:ctrlPr>
+                      </m:sSubPr>
+                      <m:e>
+                        <m:r>
+                          <a:rPr lang="en-US" b="1" i="1" baseline="0" smtClean="0">
+                            <a:latin typeface="Cambria Math" panose="02040503050406030204" pitchFamily="18" charset="0"/>
+                          </a:rPr>
+                          <m:t>𝒙</m:t>
+                        </m:r>
+                      </m:e>
+                      <m:sub>
+                        <m:r>
+                          <a:rPr lang="en-US" b="0" i="1" baseline="0" smtClean="0">
+                            <a:latin typeface="Cambria Math" panose="02040503050406030204" pitchFamily="18" charset="0"/>
+                          </a:rPr>
+                          <m:t>2</m:t>
+                        </m:r>
+                      </m:sub>
+                    </m:sSub>
+                  </m:oMath>
+                </a14:m>
+                <a:r>
+                  <a:rPr lang="en-US" baseline="0" dirty="0"/>
+                  <a:t>) or by columns (</a:t>
+                </a:r>
+                <a14:m>
+                  <m:oMath xmlns:m="http://schemas.openxmlformats.org/officeDocument/2006/math">
+                    <m:r>
+                      <a:rPr lang="en-US" b="1" i="1" baseline="0" smtClean="0">
+                        <a:latin typeface="Cambria Math" panose="02040503050406030204" pitchFamily="18" charset="0"/>
+                      </a:rPr>
+                      <m:t>𝒙</m:t>
+                    </m:r>
+                  </m:oMath>
+                </a14:m>
+                <a:r>
+                  <a:rPr lang="en-US" baseline="0" dirty="0"/>
+                  <a:t>, </a:t>
+                </a:r>
+                <a14:m>
+                  <m:oMath xmlns:m="http://schemas.openxmlformats.org/officeDocument/2006/math">
+                    <m:r>
+                      <a:rPr lang="en-US" b="1" i="1" baseline="0" smtClean="0">
+                        <a:latin typeface="Cambria Math" panose="02040503050406030204" pitchFamily="18" charset="0"/>
+                      </a:rPr>
+                      <m:t>𝒚</m:t>
+                    </m:r>
+                  </m:oMath>
+                </a14:m>
+                <a:r>
+                  <a:rPr lang="en-US" baseline="0" dirty="0"/>
+                  <a:t>).</a:t>
+                </a:r>
+                <a:endParaRPr lang="en-US" dirty="0"/>
+              </a:p>
             </p:txBody>
           </p:sp>
         </mc:Choice>
@@ -1271,10 +1495,7 @@
               <a:bodyPr/>
               <a:lstStyle/>
               <a:p>
-                <a:r>
-                  <a:rPr lang="en-US" dirty="0"/>
-                  <a:t>Why matrix form is important? Because it makes notations easier, it helps to abstract up theory, it’s the preferred way to compute since there is compiler speed up for vectorized form, in contrast to (for) loops.</a:t>
-                </a:r>
+                <a:endParaRPr lang="en-US" dirty="0"/>
               </a:p>
             </p:txBody>
           </p:sp>
@@ -1490,6 +1711,59 @@
                   <a:rPr lang="en-US" dirty="0"/>
                   <a:t>.</a:t>
                 </a:r>
+              </a:p>
+              <a:p>
+                <a:endParaRPr lang="en-US" dirty="0"/>
+              </a:p>
+              <a:p>
+                <a:pPr marL="0" marR="0" lvl="0" indent="0" algn="l" defTabSz="914400" rtl="0" eaLnBrk="1" fontAlgn="auto" latinLnBrk="0" hangingPunct="1">
+                  <a:lnSpc>
+                    <a:spcPct val="100000"/>
+                  </a:lnSpc>
+                  <a:spcBef>
+                    <a:spcPts val="0"/>
+                  </a:spcBef>
+                  <a:spcAft>
+                    <a:spcPts val="0"/>
+                  </a:spcAft>
+                  <a:buClrTx/>
+                  <a:buSzTx/>
+                  <a:buFontTx/>
+                  <a:buNone/>
+                  <a:tabLst/>
+                  <a:defRPr/>
+                </a:pPr>
+                <a:r>
+                  <a:rPr lang="en-US" dirty="0"/>
+                  <a:t>ToDo: In Python,</a:t>
+                </a:r>
+                <a:r>
+                  <a:rPr lang="en-US" baseline="0" dirty="0"/>
+                  <a:t> c</a:t>
+                </a:r>
+                <a:r>
+                  <a:rPr lang="en-US" dirty="0"/>
+                  <a:t>ompute the</a:t>
+                </a:r>
+                <a:r>
+                  <a:rPr lang="en-US" baseline="0" dirty="0"/>
+                  <a:t> </a:t>
+                </a:r>
+                <a:r>
+                  <a:rPr lang="en-US" dirty="0"/>
+                  <a:t>error </a:t>
+                </a:r>
+                <a14:m>
+                  <m:oMath xmlns:m="http://schemas.openxmlformats.org/officeDocument/2006/math">
+                    <m:r>
+                      <a:rPr lang="en-US" b="0" i="1" smtClean="0">
+                        <a:latin typeface="Cambria Math" panose="02040503050406030204" pitchFamily="18" charset="0"/>
+                      </a:rPr>
+                      <m:t>𝜀</m:t>
+                    </m:r>
+                  </m:oMath>
+                </a14:m>
+                <a:endParaRPr lang="en-US" dirty="0"/>
               </a:p>
               <a:p>
                 <a:endParaRPr lang="en-US" dirty="0"/>
@@ -2904,6 +3178,43 @@
                 </a:r>
                 <a:r>
                   <a:rPr lang="en-US" dirty="0"/>
+                  <a:t>: In Python,</a:t>
+                </a:r>
+                <a:r>
+                  <a:rPr lang="en-US" baseline="0" dirty="0"/>
+                  <a:t> c</a:t>
+                </a:r>
+                <a:r>
+                  <a:rPr lang="en-US" dirty="0"/>
+                  <a:t>ompute the</a:t>
+                </a:r>
+                <a:r>
+                  <a:rPr lang="en-US" baseline="0" dirty="0"/>
+                  <a:t> </a:t>
+                </a:r>
+                <a:r>
+                  <a:rPr lang="en-US" dirty="0"/>
+                  <a:t>error </a:t>
+                </a:r>
+                <a14:m>
+                  <m:oMath xmlns:m="http://schemas.openxmlformats.org/officeDocument/2006/math">
+                    <m:r>
+                      <a:rPr lang="en-US" b="0" i="1" smtClean="0">
+                        <a:latin typeface="Cambria Math" panose="02040503050406030204" pitchFamily="18" charset="0"/>
+                      </a:rPr>
+                      <m:t>𝜀</m:t>
+                    </m:r>
+                  </m:oMath>
+                </a14:m>
+                <a:endParaRPr lang="en-US" dirty="0"/>
+              </a:p>
+              <a:p>
+                <a:r>
+                  <a:rPr lang="en-US" dirty="0" err="1"/>
+                  <a:t>ToDo</a:t>
+                </a:r>
+                <a:r>
+                  <a:rPr lang="en-US" dirty="0"/>
                   <a:t>: Create an interactive plot (charts.js?) with a slider to change the slope </a:t>
                 </a:r>
                 <a14:m>
@@ -3714,7 +4025,7 @@
           <a:p>
             <a:fld id="{FE070745-F5EF-4AE3-92EF-0934EDED1862}" type="datetimeFigureOut">
               <a:rPr lang="en-US" smtClean="0"/>
-              <a:t>2/11/2020</a:t>
+              <a:t>2/13/2020</a:t>
             </a:fld>
             <a:endParaRPr lang="en-US"/>
           </a:p>
@@ -3884,7 +4195,7 @@
           <a:p>
             <a:fld id="{FE070745-F5EF-4AE3-92EF-0934EDED1862}" type="datetimeFigureOut">
               <a:rPr lang="en-US" smtClean="0"/>
-              <a:t>2/11/2020</a:t>
+              <a:t>2/13/2020</a:t>
             </a:fld>
             <a:endParaRPr lang="en-US"/>
           </a:p>
@@ -4064,7 +4375,7 @@
           <a:p>
             <a:fld id="{FE070745-F5EF-4AE3-92EF-0934EDED1862}" type="datetimeFigureOut">
               <a:rPr lang="en-US" smtClean="0"/>
-              <a:t>2/11/2020</a:t>
+              <a:t>2/13/2020</a:t>
             </a:fld>
             <a:endParaRPr lang="en-US"/>
           </a:p>
@@ -4234,7 +4545,7 @@
           <a:p>
             <a:fld id="{FE070745-F5EF-4AE3-92EF-0934EDED1862}" type="datetimeFigureOut">
               <a:rPr lang="en-US" smtClean="0"/>
-              <a:t>2/11/2020</a:t>
+              <a:t>2/13/2020</a:t>
             </a:fld>
             <a:endParaRPr lang="en-US"/>
           </a:p>
@@ -4480,7 +4791,7 @@
           <a:p>
             <a:fld id="{FE070745-F5EF-4AE3-92EF-0934EDED1862}" type="datetimeFigureOut">
               <a:rPr lang="en-US" smtClean="0"/>
-              <a:t>2/11/2020</a:t>
+              <a:t>2/13/2020</a:t>
             </a:fld>
             <a:endParaRPr lang="en-US"/>
           </a:p>
@@ -4712,7 +5023,7 @@
           <a:p>
             <a:fld id="{FE070745-F5EF-4AE3-92EF-0934EDED1862}" type="datetimeFigureOut">
               <a:rPr lang="en-US" smtClean="0"/>
-              <a:t>2/11/2020</a:t>
+              <a:t>2/13/2020</a:t>
             </a:fld>
             <a:endParaRPr lang="en-US"/>
           </a:p>
@@ -5079,7 +5390,7 @@
           <a:p>
             <a:fld id="{FE070745-F5EF-4AE3-92EF-0934EDED1862}" type="datetimeFigureOut">
               <a:rPr lang="en-US" smtClean="0"/>
-              <a:t>2/11/2020</a:t>
+              <a:t>2/13/2020</a:t>
             </a:fld>
             <a:endParaRPr lang="en-US"/>
           </a:p>
@@ -5197,7 +5508,7 @@
           <a:p>
             <a:fld id="{FE070745-F5EF-4AE3-92EF-0934EDED1862}" type="datetimeFigureOut">
               <a:rPr lang="en-US" smtClean="0"/>
-              <a:t>2/11/2020</a:t>
+              <a:t>2/13/2020</a:t>
             </a:fld>
             <a:endParaRPr lang="en-US"/>
           </a:p>
@@ -5292,7 +5603,7 @@
           <a:p>
             <a:fld id="{FE070745-F5EF-4AE3-92EF-0934EDED1862}" type="datetimeFigureOut">
               <a:rPr lang="en-US" smtClean="0"/>
-              <a:t>2/11/2020</a:t>
+              <a:t>2/13/2020</a:t>
             </a:fld>
             <a:endParaRPr lang="en-US"/>
           </a:p>
@@ -5569,7 +5880,7 @@
           <a:p>
             <a:fld id="{FE070745-F5EF-4AE3-92EF-0934EDED1862}" type="datetimeFigureOut">
               <a:rPr lang="en-US" smtClean="0"/>
-              <a:t>2/11/2020</a:t>
+              <a:t>2/13/2020</a:t>
             </a:fld>
             <a:endParaRPr lang="en-US"/>
           </a:p>
@@ -5826,7 +6137,7 @@
           <a:p>
             <a:fld id="{FE070745-F5EF-4AE3-92EF-0934EDED1862}" type="datetimeFigureOut">
               <a:rPr lang="en-US" smtClean="0"/>
-              <a:t>2/11/2020</a:t>
+              <a:t>2/13/2020</a:t>
             </a:fld>
             <a:endParaRPr lang="en-US"/>
           </a:p>
@@ -6039,7 +6350,7 @@
           <a:p>
             <a:fld id="{FE070745-F5EF-4AE3-92EF-0934EDED1862}" type="datetimeFigureOut">
               <a:rPr lang="en-US" smtClean="0"/>
-              <a:t>2/11/2020</a:t>
+              <a:t>2/13/2020</a:t>
             </a:fld>
             <a:endParaRPr lang="en-US"/>
           </a:p>
@@ -22220,7 +22531,7 @@
         </p:blipFill>
         <p:spPr>
           <a:xfrm>
-            <a:off x="4764875" y="1491296"/>
+            <a:off x="5644769" y="3920719"/>
             <a:ext cx="4322853" cy="2937281"/>
           </a:xfrm>
           <a:prstGeom prst="rect">
@@ -22228,8 +22539,8 @@
           </a:prstGeom>
         </p:spPr>
       </p:pic>
-      <mc:AlternateContent xmlns:mc="http://schemas.openxmlformats.org/markup-compatibility/2006" xmlns:a14="http://schemas.microsoft.com/office/drawing/2010/main">
-        <mc:Choice Requires="a14">
+      <mc:AlternateContent xmlns:mc="http://schemas.openxmlformats.org/markup-compatibility/2006">
+        <mc:Choice xmlns:a14="http://schemas.microsoft.com/office/drawing/2010/main" Requires="a14">
           <p:sp>
             <p:nvSpPr>
               <p:cNvPr id="4" name="TextBox 3">
@@ -22244,7 +22555,7 @@
             </p:nvSpPr>
             <p:spPr>
               <a:xfrm>
-                <a:off x="838200" y="1958070"/>
+                <a:off x="1718094" y="4387493"/>
                 <a:ext cx="2452120" cy="461665"/>
               </a:xfrm>
               <a:prstGeom prst="rect">
@@ -22267,18 +22578,27 @@
                     <m:oMath xmlns:m="http://schemas.openxmlformats.org/officeDocument/2006/math">
                       <m:r>
                         <a:rPr lang="en-US" sz="2400" b="0" i="1" smtClean="0">
+                          <a:solidFill>
+                            <a:srgbClr val="0070C0"/>
+                          </a:solidFill>
                           <a:latin typeface="Cambria Math" panose="02040503050406030204" pitchFamily="18" charset="0"/>
                         </a:rPr>
                         <m:t>𝑦</m:t>
                       </m:r>
                       <m:r>
                         <a:rPr lang="en-US" sz="2400" b="0" i="1" smtClean="0">
+                          <a:solidFill>
+                            <a:srgbClr val="0070C0"/>
+                          </a:solidFill>
                           <a:latin typeface="Cambria Math" panose="02040503050406030204" pitchFamily="18" charset="0"/>
                         </a:rPr>
                         <m:t>=</m:t>
                       </m:r>
                       <m:r>
                         <a:rPr lang="en-US" sz="2400" b="0" i="1" smtClean="0">
+                          <a:solidFill>
+                            <a:srgbClr val="0070C0"/>
+                          </a:solidFill>
                           <a:latin typeface="Cambria Math" panose="02040503050406030204" pitchFamily="18" charset="0"/>
                         </a:rPr>
                         <m:t>𝐴</m:t>
@@ -22287,6 +22607,9 @@
                         <m:funcPr>
                           <m:ctrlPr>
                             <a:rPr lang="en-US" sz="2400" b="0" i="1" smtClean="0">
+                              <a:solidFill>
+                                <a:srgbClr val="0070C0"/>
+                              </a:solidFill>
                               <a:latin typeface="Cambria Math" panose="02040503050406030204" pitchFamily="18" charset="0"/>
                             </a:rPr>
                           </m:ctrlPr>
@@ -22297,6 +22620,9 @@
                               <m:sty m:val="p"/>
                             </m:rPr>
                             <a:rPr lang="en-US" sz="2400" b="0" i="0" smtClean="0">
+                              <a:solidFill>
+                                <a:srgbClr val="0070C0"/>
+                              </a:solidFill>
                               <a:latin typeface="Cambria Math" panose="02040503050406030204" pitchFamily="18" charset="0"/>
                             </a:rPr>
                             <m:t>sin</m:t>
@@ -22305,18 +22631,27 @@
                         <m:e>
                           <m:r>
                             <a:rPr lang="en-US" sz="2400" b="0" i="1" smtClean="0">
+                              <a:solidFill>
+                                <a:srgbClr val="0070C0"/>
+                              </a:solidFill>
                               <a:latin typeface="Cambria Math" panose="02040503050406030204" pitchFamily="18" charset="0"/>
                             </a:rPr>
                             <m:t>(</m:t>
                           </m:r>
                           <m:r>
                             <a:rPr lang="en-US" sz="2400" b="0" i="1" smtClean="0">
+                              <a:solidFill>
+                                <a:srgbClr val="0070C0"/>
+                              </a:solidFill>
                               <a:latin typeface="Cambria Math" panose="02040503050406030204" pitchFamily="18" charset="0"/>
                             </a:rPr>
                             <m:t>𝑥</m:t>
                           </m:r>
                           <m:r>
                             <a:rPr lang="en-US" sz="2400" b="0" i="1" smtClean="0">
+                              <a:solidFill>
+                                <a:srgbClr val="0070C0"/>
+                              </a:solidFill>
                               <a:latin typeface="Cambria Math" panose="02040503050406030204" pitchFamily="18" charset="0"/>
                             </a:rPr>
                             <m:t>)</m:t>
@@ -22326,12 +22661,16 @@
                     </m:oMath>
                   </m:oMathPara>
                 </a14:m>
-                <a:endParaRPr lang="en-US" sz="2400" dirty="0"/>
+                <a:endParaRPr lang="en-US" sz="2400" dirty="0">
+                  <a:solidFill>
+                    <a:srgbClr val="0070C0"/>
+                  </a:solidFill>
+                </a:endParaRPr>
               </a:p>
             </p:txBody>
           </p:sp>
         </mc:Choice>
-        <mc:Fallback xmlns="">
+        <mc:Fallback>
           <p:sp>
             <p:nvSpPr>
               <p:cNvPr id="4" name="TextBox 3">
@@ -22348,7 +22687,7 @@
             </p:nvSpPr>
             <p:spPr>
               <a:xfrm>
-                <a:off x="838200" y="1958070"/>
+                <a:off x="1718094" y="4387493"/>
                 <a:ext cx="2452120" cy="461665"/>
               </a:xfrm>
               <a:prstGeom prst="rect">
@@ -22357,7 +22696,7 @@
               <a:blipFill>
                 <a:blip r:embed="rId3"/>
                 <a:stretch>
-                  <a:fillRect b="-17105"/>
+                  <a:fillRect b="-18667"/>
                 </a:stretch>
               </a:blipFill>
             </p:spPr>
@@ -22392,7 +22731,7 @@
         </p:nvSpPr>
         <p:spPr>
           <a:xfrm>
-            <a:off x="8322298" y="3337560"/>
+            <a:off x="9202192" y="5766983"/>
             <a:ext cx="182880" cy="182880"/>
           </a:xfrm>
           <a:prstGeom prst="ellipse">
@@ -22440,7 +22779,7 @@
         </p:nvSpPr>
         <p:spPr>
           <a:xfrm>
-            <a:off x="4899279" y="2959937"/>
+            <a:off x="5779173" y="5389360"/>
             <a:ext cx="182880" cy="182880"/>
           </a:xfrm>
           <a:prstGeom prst="ellipse">
@@ -22488,7 +22827,7 @@
         </p:nvSpPr>
         <p:spPr>
           <a:xfrm>
-            <a:off x="5970768" y="2112478"/>
+            <a:off x="6850662" y="4541901"/>
             <a:ext cx="182880" cy="182880"/>
           </a:xfrm>
           <a:prstGeom prst="ellipse">
@@ -22536,7 +22875,7 @@
         </p:nvSpPr>
         <p:spPr>
           <a:xfrm>
-            <a:off x="7042258" y="2959937"/>
+            <a:off x="7922152" y="5389360"/>
             <a:ext cx="182880" cy="182880"/>
           </a:xfrm>
           <a:prstGeom prst="ellipse">
@@ -22565,6 +22904,215 @@
           <a:p>
             <a:pPr algn="ctr"/>
             <a:endParaRPr lang="en-US"/>
+          </a:p>
+        </p:txBody>
+      </p:sp>
+      <mc:AlternateContent xmlns:mc="http://schemas.openxmlformats.org/markup-compatibility/2006">
+        <mc:Choice xmlns:a14="http://schemas.microsoft.com/office/drawing/2010/main" Requires="a14">
+          <p:sp>
+            <p:nvSpPr>
+              <p:cNvPr id="9" name="TextBox 8">
+                <a:extLst>
+                  <a:ext uri="{FF2B5EF4-FFF2-40B4-BE49-F238E27FC236}">
+                    <a16:creationId xmlns:a16="http://schemas.microsoft.com/office/drawing/2014/main" id="{A65197FB-5F43-4E06-87A6-FDB4B2D8BA19}"/>
+                  </a:ext>
+                </a:extLst>
+              </p:cNvPr>
+              <p:cNvSpPr txBox="1"/>
+              <p:nvPr/>
+            </p:nvSpPr>
+            <p:spPr>
+              <a:xfrm>
+                <a:off x="1718094" y="1897619"/>
+                <a:ext cx="2452120" cy="461665"/>
+              </a:xfrm>
+              <a:prstGeom prst="rect">
+                <a:avLst/>
+              </a:prstGeom>
+              <a:noFill/>
+            </p:spPr>
+            <p:txBody>
+              <a:bodyPr wrap="square" rtlCol="0">
+                <a:spAutoFit/>
+              </a:bodyPr>
+              <a:lstStyle/>
+              <a:p>
+                <a:pPr/>
+                <a14:m>
+                  <m:oMathPara xmlns:m="http://schemas.openxmlformats.org/officeDocument/2006/math">
+                    <m:oMathParaPr>
+                      <m:jc m:val="centerGroup"/>
+                    </m:oMathParaPr>
+                    <m:oMath xmlns:m="http://schemas.openxmlformats.org/officeDocument/2006/math">
+                      <m:r>
+                        <a:rPr lang="en-US" sz="2400" b="0" i="1" smtClean="0">
+                          <a:solidFill>
+                            <a:srgbClr val="0070C0"/>
+                          </a:solidFill>
+                          <a:latin typeface="Cambria Math" panose="02040503050406030204" pitchFamily="18" charset="0"/>
+                        </a:rPr>
+                        <m:t>𝑦</m:t>
+                      </m:r>
+                      <m:r>
+                        <a:rPr lang="en-US" sz="2400" b="0" i="1" smtClean="0">
+                          <a:solidFill>
+                            <a:srgbClr val="0070C0"/>
+                          </a:solidFill>
+                          <a:latin typeface="Cambria Math" panose="02040503050406030204" pitchFamily="18" charset="0"/>
+                        </a:rPr>
+                        <m:t>=</m:t>
+                      </m:r>
+                      <m:r>
+                        <a:rPr lang="en-US" sz="2400" b="0" i="1" smtClean="0">
+                          <a:solidFill>
+                            <a:srgbClr val="0070C0"/>
+                          </a:solidFill>
+                          <a:latin typeface="Cambria Math" panose="02040503050406030204" pitchFamily="18" charset="0"/>
+                        </a:rPr>
+                        <m:t>𝜃</m:t>
+                      </m:r>
+                      <m:r>
+                        <a:rPr lang="en-US" sz="2400" b="0" i="1" smtClean="0">
+                          <a:solidFill>
+                            <a:srgbClr val="0070C0"/>
+                          </a:solidFill>
+                          <a:latin typeface="Cambria Math" panose="02040503050406030204" pitchFamily="18" charset="0"/>
+                        </a:rPr>
+                        <m:t>𝑥</m:t>
+                      </m:r>
+                      <m:r>
+                        <a:rPr lang="en-US" sz="2400" b="0" i="1" smtClean="0">
+                          <a:solidFill>
+                            <a:srgbClr val="0070C0"/>
+                          </a:solidFill>
+                          <a:latin typeface="Cambria Math" panose="02040503050406030204" pitchFamily="18" charset="0"/>
+                        </a:rPr>
+                        <m:t>+5</m:t>
+                      </m:r>
+                    </m:oMath>
+                  </m:oMathPara>
+                </a14:m>
+                <a:endParaRPr lang="en-US" sz="2400" dirty="0">
+                  <a:solidFill>
+                    <a:srgbClr val="0070C0"/>
+                  </a:solidFill>
+                </a:endParaRPr>
+              </a:p>
+            </p:txBody>
+          </p:sp>
+        </mc:Choice>
+        <mc:Fallback>
+          <p:sp>
+            <p:nvSpPr>
+              <p:cNvPr id="9" name="TextBox 8">
+                <a:extLst>
+                  <a:ext uri="{FF2B5EF4-FFF2-40B4-BE49-F238E27FC236}">
+                    <a16:creationId xmlns:a16="http://schemas.microsoft.com/office/drawing/2014/main" id="{A65197FB-5F43-4E06-87A6-FDB4B2D8BA19}"/>
+                  </a:ext>
+                </a:extLst>
+              </p:cNvPr>
+              <p:cNvSpPr txBox="1">
+                <a:spLocks noRot="1" noChangeAspect="1" noMove="1" noResize="1" noEditPoints="1" noAdjustHandles="1" noChangeArrowheads="1" noChangeShapeType="1" noTextEdit="1"/>
+              </p:cNvSpPr>
+              <p:nvPr/>
+            </p:nvSpPr>
+            <p:spPr>
+              <a:xfrm>
+                <a:off x="1718094" y="1897619"/>
+                <a:ext cx="2452120" cy="461665"/>
+              </a:xfrm>
+              <a:prstGeom prst="rect">
+                <a:avLst/>
+              </a:prstGeom>
+              <a:blipFill>
+                <a:blip r:embed="rId4"/>
+                <a:stretch>
+                  <a:fillRect b="-10526"/>
+                </a:stretch>
+              </a:blipFill>
+            </p:spPr>
+            <p:txBody>
+              <a:bodyPr/>
+              <a:lstStyle/>
+              <a:p>
+                <a:r>
+                  <a:rPr lang="en-US">
+                    <a:noFill/>
+                  </a:rPr>
+                  <a:t> </a:t>
+                </a:r>
+              </a:p>
+            </p:txBody>
+          </p:sp>
+        </mc:Fallback>
+      </mc:AlternateContent>
+      <p:sp>
+        <p:nvSpPr>
+          <p:cNvPr id="10" name="TextBox 9">
+            <a:extLst>
+              <a:ext uri="{FF2B5EF4-FFF2-40B4-BE49-F238E27FC236}">
+                <a16:creationId xmlns:a16="http://schemas.microsoft.com/office/drawing/2014/main" id="{07E860FA-3660-43AA-B6AE-D7F2B659970D}"/>
+              </a:ext>
+            </a:extLst>
+          </p:cNvPr>
+          <p:cNvSpPr txBox="1"/>
+          <p:nvPr/>
+        </p:nvSpPr>
+        <p:spPr>
+          <a:xfrm>
+            <a:off x="294735" y="1897619"/>
+            <a:ext cx="1086929" cy="461665"/>
+          </a:xfrm>
+          <a:prstGeom prst="rect">
+            <a:avLst/>
+          </a:prstGeom>
+          <a:noFill/>
+        </p:spPr>
+        <p:txBody>
+          <a:bodyPr wrap="square" rtlCol="0">
+            <a:spAutoFit/>
+          </a:bodyPr>
+          <a:lstStyle/>
+          <a:p>
+            <a:r>
+              <a:rPr lang="en-US" sz="2400" dirty="0"/>
+              <a:t>1.</a:t>
+            </a:r>
+          </a:p>
+        </p:txBody>
+      </p:sp>
+      <p:sp>
+        <p:nvSpPr>
+          <p:cNvPr id="11" name="TextBox 10">
+            <a:extLst>
+              <a:ext uri="{FF2B5EF4-FFF2-40B4-BE49-F238E27FC236}">
+                <a16:creationId xmlns:a16="http://schemas.microsoft.com/office/drawing/2014/main" id="{1CDE5121-E248-4A7D-B398-DE1F5AF4A852}"/>
+              </a:ext>
+            </a:extLst>
+          </p:cNvPr>
+          <p:cNvSpPr txBox="1"/>
+          <p:nvPr/>
+        </p:nvSpPr>
+        <p:spPr>
+          <a:xfrm>
+            <a:off x="294735" y="4311068"/>
+            <a:ext cx="1086929" cy="461665"/>
+          </a:xfrm>
+          <a:prstGeom prst="rect">
+            <a:avLst/>
+          </a:prstGeom>
+          <a:noFill/>
+        </p:spPr>
+        <p:txBody>
+          <a:bodyPr wrap="square" rtlCol="0">
+            <a:spAutoFit/>
+          </a:bodyPr>
+          <a:lstStyle/>
+          <a:p>
+            <a:r>
+              <a:rPr lang="en-US" sz="2400" dirty="0"/>
+              <a:t>2.</a:t>
+            </a:r>
           </a:p>
         </p:txBody>
       </p:sp>
@@ -26019,8 +26567,8 @@
           </p:sp>
         </mc:Fallback>
       </mc:AlternateContent>
-      <mc:AlternateContent xmlns:mc="http://schemas.openxmlformats.org/markup-compatibility/2006">
-        <mc:Choice xmlns:a14="http://schemas.microsoft.com/office/drawing/2010/main" Requires="a14">
+      <mc:AlternateContent xmlns:mc="http://schemas.openxmlformats.org/markup-compatibility/2006" xmlns:a14="http://schemas.microsoft.com/office/drawing/2010/main">
+        <mc:Choice Requires="a14">
           <p:sp>
             <p:nvSpPr>
               <p:cNvPr id="39" name="Rectangle 38">
@@ -26258,7 +26806,7 @@
             </p:txBody>
           </p:sp>
         </mc:Choice>
-        <mc:Fallback>
+        <mc:Fallback xmlns="">
           <p:sp>
             <p:nvSpPr>
               <p:cNvPr id="39" name="Rectangle 38">
@@ -26761,8 +27309,8 @@
           </p:sp>
         </mc:Fallback>
       </mc:AlternateContent>
-      <mc:AlternateContent xmlns:mc="http://schemas.openxmlformats.org/markup-compatibility/2006">
-        <mc:Choice xmlns:a14="http://schemas.microsoft.com/office/drawing/2010/main" Requires="a14">
+      <mc:AlternateContent xmlns:mc="http://schemas.openxmlformats.org/markup-compatibility/2006" xmlns:a14="http://schemas.microsoft.com/office/drawing/2010/main">
+        <mc:Choice Requires="a14">
           <p:sp>
             <p:nvSpPr>
               <p:cNvPr id="22" name="TextBox 21">
@@ -26825,7 +27373,7 @@
             </p:txBody>
           </p:sp>
         </mc:Choice>
-        <mc:Fallback>
+        <mc:Fallback xmlns="">
           <p:sp>
             <p:nvSpPr>
               <p:cNvPr id="22" name="TextBox 21">
@@ -29735,8 +30283,8 @@
           </a:p>
         </p:txBody>
       </p:sp>
-      <mc:AlternateContent xmlns:mc="http://schemas.openxmlformats.org/markup-compatibility/2006">
-        <mc:Choice xmlns:a14="http://schemas.microsoft.com/office/drawing/2010/main" Requires="a14">
+      <mc:AlternateContent xmlns:mc="http://schemas.openxmlformats.org/markup-compatibility/2006" xmlns:a14="http://schemas.microsoft.com/office/drawing/2010/main">
+        <mc:Choice Requires="a14">
           <p:sp>
             <p:nvSpPr>
               <p:cNvPr id="22" name="Rectangle 21">
@@ -29842,7 +30390,7 @@
             </p:txBody>
           </p:sp>
         </mc:Choice>
-        <mc:Fallback>
+        <mc:Fallback xmlns="">
           <p:sp>
             <p:nvSpPr>
               <p:cNvPr id="22" name="Rectangle 21">
@@ -29887,8 +30435,8 @@
           </p:sp>
         </mc:Fallback>
       </mc:AlternateContent>
-      <mc:AlternateContent xmlns:mc="http://schemas.openxmlformats.org/markup-compatibility/2006">
-        <mc:Choice xmlns:a14="http://schemas.microsoft.com/office/drawing/2010/main" Requires="a14">
+      <mc:AlternateContent xmlns:mc="http://schemas.openxmlformats.org/markup-compatibility/2006" xmlns:a14="http://schemas.microsoft.com/office/drawing/2010/main">
+        <mc:Choice Requires="a14">
           <p:sp>
             <p:nvSpPr>
               <p:cNvPr id="23" name="Rectangle 22">
@@ -30029,7 +30577,7 @@
             </p:txBody>
           </p:sp>
         </mc:Choice>
-        <mc:Fallback>
+        <mc:Fallback xmlns="">
           <p:sp>
             <p:nvSpPr>
               <p:cNvPr id="23" name="Rectangle 22">
@@ -30342,8 +30890,8 @@
           </a:fontRef>
         </p:style>
       </p:cxnSp>
-      <mc:AlternateContent xmlns:mc="http://schemas.openxmlformats.org/markup-compatibility/2006">
-        <mc:Choice xmlns:a14="http://schemas.microsoft.com/office/drawing/2010/main" Requires="a14">
+      <mc:AlternateContent xmlns:mc="http://schemas.openxmlformats.org/markup-compatibility/2006" xmlns:a14="http://schemas.microsoft.com/office/drawing/2010/main">
+        <mc:Choice Requires="a14">
           <p:sp>
             <p:nvSpPr>
               <p:cNvPr id="29" name="TextBox 28">
@@ -30372,6 +30920,7 @@
               </a:bodyPr>
               <a:lstStyle/>
               <a:p>
+                <a:pPr/>
                 <a14:m>
                   <m:oMathPara xmlns:m="http://schemas.openxmlformats.org/officeDocument/2006/math">
                     <m:oMathParaPr>
@@ -30425,13 +30974,7 @@
                         <a:rPr lang="en-US" sz="2400" b="0" i="1" smtClean="0">
                           <a:latin typeface="Cambria Math" panose="02040503050406030204" pitchFamily="18" charset="0"/>
                         </a:rPr>
-                        <m:t>=</m:t>
-                      </m:r>
-                      <m:r>
-                        <a:rPr lang="en-US" sz="2400" b="0" i="1" smtClean="0">
-                          <a:latin typeface="Cambria Math" panose="02040503050406030204" pitchFamily="18" charset="0"/>
-                        </a:rPr>
-                        <m:t>0</m:t>
+                        <m:t>=0</m:t>
                       </m:r>
                     </m:oMath>
                   </m:oMathPara>
@@ -30441,7 +30984,7 @@
             </p:txBody>
           </p:sp>
         </mc:Choice>
-        <mc:Fallback>
+        <mc:Fallback xmlns="">
           <p:sp>
             <p:nvSpPr>
               <p:cNvPr id="29" name="TextBox 28">
@@ -30486,8 +31029,8 @@
           </p:sp>
         </mc:Fallback>
       </mc:AlternateContent>
-      <mc:AlternateContent xmlns:mc="http://schemas.openxmlformats.org/markup-compatibility/2006">
-        <mc:Choice xmlns:a14="http://schemas.microsoft.com/office/drawing/2010/main" Requires="a14">
+      <mc:AlternateContent xmlns:mc="http://schemas.openxmlformats.org/markup-compatibility/2006" xmlns:a14="http://schemas.microsoft.com/office/drawing/2010/main">
+        <mc:Choice Requires="a14">
           <p:sp>
             <p:nvSpPr>
               <p:cNvPr id="31" name="Rectangle 30">
@@ -30580,7 +31123,7 @@
             </p:txBody>
           </p:sp>
         </mc:Choice>
-        <mc:Fallback>
+        <mc:Fallback xmlns="">
           <p:sp>
             <p:nvSpPr>
               <p:cNvPr id="31" name="Rectangle 30">
@@ -30829,8 +31372,8 @@
           </p:sp>
         </mc:Fallback>
       </mc:AlternateContent>
-      <mc:AlternateContent xmlns:mc="http://schemas.openxmlformats.org/markup-compatibility/2006">
-        <mc:Choice xmlns:a14="http://schemas.microsoft.com/office/drawing/2010/main" Requires="a14">
+      <mc:AlternateContent xmlns:mc="http://schemas.openxmlformats.org/markup-compatibility/2006" xmlns:a14="http://schemas.microsoft.com/office/drawing/2010/main">
+        <mc:Choice Requires="a14">
           <p:sp>
             <p:nvSpPr>
               <p:cNvPr id="26" name="Rectangle 25">
@@ -30954,7 +31497,7 @@
             </p:txBody>
           </p:sp>
         </mc:Choice>
-        <mc:Fallback>
+        <mc:Fallback xmlns="">
           <p:sp>
             <p:nvSpPr>
               <p:cNvPr id="26" name="Rectangle 25">
@@ -31042,8 +31585,8 @@
           </a:fontRef>
         </p:style>
       </p:cxnSp>
-      <mc:AlternateContent xmlns:mc="http://schemas.openxmlformats.org/markup-compatibility/2006">
-        <mc:Choice xmlns:a14="http://schemas.microsoft.com/office/drawing/2010/main" Requires="a14">
+      <mc:AlternateContent xmlns:mc="http://schemas.openxmlformats.org/markup-compatibility/2006" xmlns:a14="http://schemas.microsoft.com/office/drawing/2010/main">
+        <mc:Choice Requires="a14">
           <p:sp>
             <p:nvSpPr>
               <p:cNvPr id="8" name="Rectangle 7">
@@ -31071,7 +31614,6 @@
               </a:bodyPr>
               <a:lstStyle/>
               <a:p>
-                <a:pPr/>
                 <a:r>
                   <a:rPr lang="en-US" sz="2400" dirty="0"/>
                   <a:t> </a:t>
@@ -31104,13 +31646,7 @@
                       <a:rPr lang="en-US" sz="2400" i="1" dirty="0">
                         <a:latin typeface="Cambria Math" panose="02040503050406030204" pitchFamily="18" charset="0"/>
                       </a:rPr>
-                      <m:t>=4/12</m:t>
-                    </m:r>
-                    <m:r>
-                      <a:rPr lang="en-US" sz="2400" i="1" dirty="0">
-                        <a:latin typeface="Cambria Math" panose="02040503050406030204" pitchFamily="18" charset="0"/>
-                      </a:rPr>
-                      <m:t>=</m:t>
+                      <m:t>=4/12=</m:t>
                     </m:r>
                     <m:sSub>
                       <m:sSubPr>
@@ -31175,7 +31711,7 @@
             </p:txBody>
           </p:sp>
         </mc:Choice>
-        <mc:Fallback>
+        <mc:Fallback xmlns="">
           <p:sp>
             <p:nvSpPr>
               <p:cNvPr id="8" name="Rectangle 7">
@@ -31220,8 +31756,8 @@
           </p:sp>
         </mc:Fallback>
       </mc:AlternateContent>
-      <mc:AlternateContent xmlns:mc="http://schemas.openxmlformats.org/markup-compatibility/2006">
-        <mc:Choice xmlns:a14="http://schemas.microsoft.com/office/drawing/2010/main" Requires="a14">
+      <mc:AlternateContent xmlns:mc="http://schemas.openxmlformats.org/markup-compatibility/2006" xmlns:a14="http://schemas.microsoft.com/office/drawing/2010/main">
+        <mc:Choice Requires="a14">
           <p:sp>
             <p:nvSpPr>
               <p:cNvPr id="30" name="Rectangle 29">
@@ -31368,7 +31904,7 @@
             </p:txBody>
           </p:sp>
         </mc:Choice>
-        <mc:Fallback>
+        <mc:Fallback xmlns="">
           <p:sp>
             <p:nvSpPr>
               <p:cNvPr id="30" name="Rectangle 29">
@@ -33997,8 +34533,8 @@
           </p:sp>
         </mc:Fallback>
       </mc:AlternateContent>
-      <mc:AlternateContent xmlns:mc="http://schemas.openxmlformats.org/markup-compatibility/2006">
-        <mc:Choice xmlns:a14="http://schemas.microsoft.com/office/drawing/2010/main" Requires="a14">
+      <mc:AlternateContent xmlns:mc="http://schemas.openxmlformats.org/markup-compatibility/2006" xmlns:a14="http://schemas.microsoft.com/office/drawing/2010/main">
+        <mc:Choice Requires="a14">
           <p:sp>
             <p:nvSpPr>
               <p:cNvPr id="23" name="Rectangle 22">
@@ -34122,7 +34658,7 @@
             </p:txBody>
           </p:sp>
         </mc:Choice>
-        <mc:Fallback>
+        <mc:Fallback xmlns="">
           <p:sp>
             <p:nvSpPr>
               <p:cNvPr id="23" name="Rectangle 22">

</xml_diff>